<commit_message>
Updated Slide and hyperlink coords
</commit_message>
<xml_diff>
--- a/documentation/Space Debris WorkFlow.pptx
+++ b/documentation/Space Debris WorkFlow.pptx
@@ -105,6 +105,11 @@
       </a:defRPr>
     </a:lvl9pPr>
   </p:defaultTextStyle>
+  <p:extLst>
+    <p:ext uri="{EFAFB233-063F-42B5-8137-9DF3F51BA10A}">
+      <p15:sldGuideLst xmlns:p15="http://schemas.microsoft.com/office/powerpoint/2012/main"/>
+    </p:ext>
+  </p:extLst>
 </p:presentation>
 </file>
 
@@ -4226,7 +4231,7 @@
             <a:pPr algn="ctr"/>
             <a:r>
               <a:rPr lang="en-US" sz="1400" dirty="0"/>
-              <a:t>Heroku Cloud</a:t>
+              <a:t>Heroku PaaS</a:t>
             </a:r>
           </a:p>
         </p:txBody>
@@ -4279,7 +4284,7 @@
             <a:pPr algn="ctr"/>
             <a:r>
               <a:rPr lang="en-US" sz="1400" dirty="0"/>
-              <a:t>Netlify Cloud</a:t>
+              <a:t>Netlify PaaS</a:t>
             </a:r>
           </a:p>
         </p:txBody>

</xml_diff>